<commit_message>
Added slide about Game Rules to the presentation
</commit_message>
<xml_diff>
--- a/Meilenstein5-presentation/Meilenstein5.pptx
+++ b/Meilenstein5-presentation/Meilenstein5.pptx
@@ -6,9 +6,10 @@
   </p:sldMasterIdLst>
   <p:sldIdLst>
     <p:sldId id="256" r:id="rId2"/>
-    <p:sldId id="257" r:id="rId3"/>
-    <p:sldId id="258" r:id="rId4"/>
-    <p:sldId id="259" r:id="rId5"/>
+    <p:sldId id="261" r:id="rId3"/>
+    <p:sldId id="257" r:id="rId4"/>
+    <p:sldId id="258" r:id="rId5"/>
+    <p:sldId id="259" r:id="rId6"/>
   </p:sldIdLst>
   <p:sldSz cx="12192000" cy="6858000"/>
   <p:notesSz cx="6858000" cy="9144000"/>
@@ -278,7 +279,7 @@
           <a:p>
             <a:fld id="{1160EA64-D806-43AC-9DF2-F8C432F32B4C}" type="datetimeFigureOut">
               <a:rPr lang="en-US" dirty="0"/>
-              <a:t>5/9/20</a:t>
+              <a:t>5/12/2020</a:t>
             </a:fld>
             <a:endParaRPr lang="en-US" dirty="0"/>
           </a:p>
@@ -321,7 +322,7 @@
             <a:fld id="{8A7A6979-0714-4377-B894-6BE4C2D6E202}" type="slidenum">
               <a:rPr lang="en-US" dirty="0"/>
               <a:pPr/>
-              <a:t>‹#›</a:t>
+              <a:t>‹Nr.›</a:t>
             </a:fld>
             <a:endParaRPr lang="en-US" dirty="0"/>
           </a:p>
@@ -444,7 +445,7 @@
           <a:p>
             <a:fld id="{E9F9C37B-1D36-470B-8223-D6C91242EC14}" type="datetimeFigureOut">
               <a:rPr lang="en-US" dirty="0"/>
-              <a:t>5/9/20</a:t>
+              <a:t>5/12/2020</a:t>
             </a:fld>
             <a:endParaRPr lang="en-US" dirty="0"/>
           </a:p>
@@ -486,7 +487,7 @@
           <a:p>
             <a:fld id="{8A7A6979-0714-4377-B894-6BE4C2D6E202}" type="slidenum">
               <a:rPr lang="en-US" dirty="0"/>
-              <a:t>‹#›</a:t>
+              <a:t>‹Nr.›</a:t>
             </a:fld>
             <a:endParaRPr lang="en-US" dirty="0"/>
           </a:p>
@@ -619,7 +620,7 @@
           <a:p>
             <a:fld id="{67C6F52A-A82B-47A2-A83A-8C4C91F2D59F}" type="datetimeFigureOut">
               <a:rPr lang="en-US" dirty="0"/>
-              <a:t>5/9/20</a:t>
+              <a:t>5/12/2020</a:t>
             </a:fld>
             <a:endParaRPr lang="en-US" dirty="0"/>
           </a:p>
@@ -661,7 +662,7 @@
           <a:p>
             <a:fld id="{8A7A6979-0714-4377-B894-6BE4C2D6E202}" type="slidenum">
               <a:rPr lang="en-US" dirty="0"/>
-              <a:t>‹#›</a:t>
+              <a:t>‹Nr.›</a:t>
             </a:fld>
             <a:endParaRPr lang="en-US" dirty="0"/>
           </a:p>
@@ -784,7 +785,7 @@
           <a:p>
             <a:fld id="{F070A7B3-6521-4DCA-87E5-044747A908C1}" type="datetimeFigureOut">
               <a:rPr lang="en-US" dirty="0"/>
-              <a:t>5/9/20</a:t>
+              <a:t>5/12/2020</a:t>
             </a:fld>
             <a:endParaRPr lang="en-US" dirty="0"/>
           </a:p>
@@ -827,7 +828,7 @@
             <a:fld id="{8A7A6979-0714-4377-B894-6BE4C2D6E202}" type="slidenum">
               <a:rPr lang="en-US" dirty="0"/>
               <a:pPr/>
-              <a:t>‹#›</a:t>
+              <a:t>‹Nr.›</a:t>
             </a:fld>
             <a:endParaRPr lang="en-US" dirty="0"/>
           </a:p>
@@ -1048,7 +1049,7 @@
           <a:p>
             <a:fld id="{1160EA64-D806-43AC-9DF2-F8C432F32B4C}" type="datetimeFigureOut">
               <a:rPr lang="en-US" dirty="0"/>
-              <a:t>5/9/20</a:t>
+              <a:t>5/12/2020</a:t>
             </a:fld>
             <a:endParaRPr lang="en-US" dirty="0"/>
           </a:p>
@@ -1091,7 +1092,7 @@
             <a:fld id="{8A7A6979-0714-4377-B894-6BE4C2D6E202}" type="slidenum">
               <a:rPr lang="en-US" dirty="0"/>
               <a:pPr/>
-              <a:t>‹#›</a:t>
+              <a:t>‹Nr.›</a:t>
             </a:fld>
             <a:endParaRPr lang="en-US" dirty="0"/>
           </a:p>
@@ -1276,7 +1277,7 @@
           <a:p>
             <a:fld id="{AB134690-1557-4C89-A502-4959FE7FAD70}" type="datetimeFigureOut">
               <a:rPr lang="en-US" dirty="0"/>
-              <a:t>5/9/20</a:t>
+              <a:t>5/12/2020</a:t>
             </a:fld>
             <a:endParaRPr lang="en-US" dirty="0"/>
           </a:p>
@@ -1318,7 +1319,7 @@
           <a:p>
             <a:fld id="{8A7A6979-0714-4377-B894-6BE4C2D6E202}" type="slidenum">
               <a:rPr lang="en-US" dirty="0"/>
-              <a:t>‹#›</a:t>
+              <a:t>‹Nr.›</a:t>
             </a:fld>
             <a:endParaRPr lang="en-US" dirty="0"/>
           </a:p>
@@ -1630,7 +1631,7 @@
           <a:p>
             <a:fld id="{4F7D4976-E339-4826-83B7-FBD03F55ECF8}" type="datetimeFigureOut">
               <a:rPr lang="en-US" dirty="0"/>
-              <a:t>5/9/20</a:t>
+              <a:t>5/12/2020</a:t>
             </a:fld>
             <a:endParaRPr lang="en-US" dirty="0"/>
           </a:p>
@@ -1672,7 +1673,7 @@
           <a:p>
             <a:fld id="{8A7A6979-0714-4377-B894-6BE4C2D6E202}" type="slidenum">
               <a:rPr lang="en-US" dirty="0"/>
-              <a:t>‹#›</a:t>
+              <a:t>‹Nr.›</a:t>
             </a:fld>
             <a:endParaRPr lang="en-US" dirty="0"/>
           </a:p>
@@ -1766,7 +1767,7 @@
           <a:p>
             <a:fld id="{E1037C31-9E7A-4F99-8774-A0E530DE1A42}" type="datetimeFigureOut">
               <a:rPr lang="en-US" dirty="0"/>
-              <a:t>5/9/20</a:t>
+              <a:t>5/12/2020</a:t>
             </a:fld>
             <a:endParaRPr lang="en-US" dirty="0"/>
           </a:p>
@@ -1808,7 +1809,7 @@
           <a:p>
             <a:fld id="{8A7A6979-0714-4377-B894-6BE4C2D6E202}" type="slidenum">
               <a:rPr lang="en-US" dirty="0"/>
-              <a:t>‹#›</a:t>
+              <a:t>‹Nr.›</a:t>
             </a:fld>
             <a:endParaRPr lang="en-US" dirty="0"/>
           </a:p>
@@ -1856,7 +1857,7 @@
           <a:p>
             <a:fld id="{C278504F-A551-4DE0-9316-4DCD1D8CC752}" type="datetimeFigureOut">
               <a:rPr lang="en-US" dirty="0"/>
-              <a:t>5/9/20</a:t>
+              <a:t>5/12/2020</a:t>
             </a:fld>
             <a:endParaRPr lang="en-US" dirty="0"/>
           </a:p>
@@ -1898,7 +1899,7 @@
           <a:p>
             <a:fld id="{8A7A6979-0714-4377-B894-6BE4C2D6E202}" type="slidenum">
               <a:rPr lang="en-US" dirty="0"/>
-              <a:t>‹#›</a:t>
+              <a:t>‹Nr.›</a:t>
             </a:fld>
             <a:endParaRPr lang="en-US" dirty="0"/>
           </a:p>
@@ -2208,7 +2209,7 @@
           <a:p>
             <a:fld id="{D1BE4249-C0D0-4B06-8692-E8BB871AF643}" type="datetimeFigureOut">
               <a:rPr lang="en-US" dirty="0"/>
-              <a:t>5/9/20</a:t>
+              <a:t>5/12/2020</a:t>
             </a:fld>
             <a:endParaRPr lang="en-US" dirty="0"/>
           </a:p>
@@ -2265,7 +2266,7 @@
           <a:p>
             <a:fld id="{8A7A6979-0714-4377-B894-6BE4C2D6E202}" type="slidenum">
               <a:rPr lang="en-US" dirty="0"/>
-              <a:t>‹#›</a:t>
+              <a:t>‹Nr.›</a:t>
             </a:fld>
             <a:endParaRPr lang="en-US" dirty="0"/>
           </a:p>
@@ -2560,7 +2561,7 @@
           <a:p>
             <a:fld id="{042B0DB6-F5C7-45FB-8CF3-31B45F9C2DAC}" type="datetimeFigureOut">
               <a:rPr lang="en-US" dirty="0"/>
-              <a:t>5/9/20</a:t>
+              <a:t>5/12/2020</a:t>
             </a:fld>
             <a:endParaRPr lang="en-US" dirty="0"/>
           </a:p>
@@ -2617,7 +2618,7 @@
           <a:p>
             <a:fld id="{8A7A6979-0714-4377-B894-6BE4C2D6E202}" type="slidenum">
               <a:rPr lang="en-US" dirty="0"/>
-              <a:t>‹#›</a:t>
+              <a:t>‹Nr.›</a:t>
             </a:fld>
             <a:endParaRPr lang="en-US" dirty="0"/>
           </a:p>
@@ -2797,7 +2798,7 @@
           <a:p>
             <a:fld id="{1160EA64-D806-43AC-9DF2-F8C432F32B4C}" type="datetimeFigureOut">
               <a:rPr lang="en-US" dirty="0"/>
-              <a:t>5/9/20</a:t>
+              <a:t>5/12/2020</a:t>
             </a:fld>
             <a:endParaRPr lang="en-US" dirty="0"/>
           </a:p>
@@ -2881,7 +2882,7 @@
             <a:fld id="{8A7A6979-0714-4377-B894-6BE4C2D6E202}" type="slidenum">
               <a:rPr lang="en-US" dirty="0"/>
               <a:pPr/>
-              <a:t>‹#›</a:t>
+              <a:t>‹Nr.›</a:t>
             </a:fld>
             <a:endParaRPr lang="en-US" dirty="0"/>
           </a:p>
@@ -3341,7 +3342,7 @@
           <p:cNvPr id="2" name="Title 1">
             <a:extLst>
               <a:ext uri="{FF2B5EF4-FFF2-40B4-BE49-F238E27FC236}">
-                <a16:creationId xmlns:a16="http://schemas.microsoft.com/office/drawing/2014/main" id="{9AF7C446-EB08-3346-B4BC-691B9C700CF9}"/>
+                <a16:creationId xmlns:a16="http://schemas.microsoft.com/office/drawing/2014/main" id="{7CCF9DE8-8AA3-6B4D-AF8A-5F04A67E6985}"/>
               </a:ext>
             </a:extLst>
           </p:cNvPr>
@@ -3358,16 +3359,114 @@
           <a:lstStyle/>
           <a:p>
             <a:r>
-              <a:rPr lang="en-CH" dirty="0"/>
-              <a:t>THE Floor is Java: DEMO</a:t>
-            </a:r>
+              <a:rPr lang="de-CH" dirty="0"/>
+              <a:t>The </a:t>
+            </a:r>
+            <a:r>
+              <a:rPr lang="de-CH" dirty="0" err="1"/>
+              <a:t>floor</a:t>
+            </a:r>
+            <a:r>
+              <a:rPr lang="de-CH" dirty="0"/>
+              <a:t> </a:t>
+            </a:r>
+            <a:r>
+              <a:rPr lang="de-CH" dirty="0" err="1"/>
+              <a:t>is</a:t>
+            </a:r>
+            <a:r>
+              <a:rPr lang="de-CH" dirty="0"/>
+              <a:t> </a:t>
+            </a:r>
+            <a:r>
+              <a:rPr lang="de-CH" dirty="0" err="1"/>
+              <a:t>java</a:t>
+            </a:r>
+            <a:r>
+              <a:rPr lang="de-CH" dirty="0"/>
+              <a:t>: game Rules</a:t>
+            </a:r>
+            <a:endParaRPr lang="en-CH" dirty="0"/>
+          </a:p>
+        </p:txBody>
+      </p:sp>
+      <p:sp>
+        <p:nvSpPr>
+          <p:cNvPr id="3" name="Content Placeholder 2">
+            <a:extLst>
+              <a:ext uri="{FF2B5EF4-FFF2-40B4-BE49-F238E27FC236}">
+                <a16:creationId xmlns:a16="http://schemas.microsoft.com/office/drawing/2014/main" id="{655B77C4-349F-FE44-855B-648927ACC211}"/>
+              </a:ext>
+            </a:extLst>
+          </p:cNvPr>
+          <p:cNvSpPr>
+            <a:spLocks noGrp="1"/>
+          </p:cNvSpPr>
+          <p:nvPr>
+            <p:ph idx="1"/>
+          </p:nvPr>
+        </p:nvSpPr>
+        <p:spPr/>
+        <p:txBody>
+          <a:bodyPr>
+            <a:normAutofit/>
+          </a:bodyPr>
+          <a:lstStyle/>
+          <a:p>
+            <a:r>
+              <a:rPr lang="de-CH" dirty="0"/>
+              <a:t>Echtzeit</a:t>
+            </a:r>
+          </a:p>
+          <a:p>
+            <a:r>
+              <a:rPr lang="de-CH" dirty="0"/>
+              <a:t>Bis zu 4 Spieler / kein Limit an Zuschauern</a:t>
+            </a:r>
+            <a:endParaRPr lang="en-CH" dirty="0"/>
+          </a:p>
+          <a:p>
+            <a:r>
+              <a:rPr lang="de-CH" dirty="0"/>
+              <a:t>Sieger ist Spieler mit meisten Punkten am Ende</a:t>
+            </a:r>
+          </a:p>
+          <a:p>
+            <a:r>
+              <a:rPr lang="de-CH" dirty="0"/>
+              <a:t>Punktgewinn durch Äpfel und grüner Fläche</a:t>
+            </a:r>
+          </a:p>
+          <a:p>
+            <a:r>
+              <a:rPr lang="de-CH" dirty="0"/>
+              <a:t>Spiel besteht aus 10 Runden à 20 Sekunden</a:t>
+            </a:r>
+          </a:p>
+          <a:p>
+            <a:r>
+              <a:rPr lang="de-CH" dirty="0"/>
+              <a:t>Am Ende jeder Runde zufällig ein Event: Überflutung, Erdbeben oder spawnen von Äpfel</a:t>
+            </a:r>
+          </a:p>
+          <a:p>
+            <a:r>
+              <a:rPr lang="de-CH" dirty="0"/>
+              <a:t>Startpositionen nicht von Events betroffen</a:t>
+            </a:r>
+          </a:p>
+          <a:p>
+            <a:pPr marL="0" indent="0">
+              <a:buNone/>
+            </a:pPr>
+            <a:endParaRPr lang="en-CH" dirty="0"/>
           </a:p>
         </p:txBody>
       </p:sp>
     </p:spTree>
     <p:extLst>
       <p:ext uri="{BB962C8B-B14F-4D97-AF65-F5344CB8AC3E}">
-        <p14:creationId xmlns:p14="http://schemas.microsoft.com/office/powerpoint/2010/main" val="5628662"/>
+        <p14:creationId xmlns:p14="http://schemas.microsoft.com/office/powerpoint/2010/main" val="403037333"/>
       </p:ext>
     </p:extLst>
   </p:cSld>
@@ -3399,6 +3498,64 @@
           <p:cNvPr id="2" name="Title 1">
             <a:extLst>
               <a:ext uri="{FF2B5EF4-FFF2-40B4-BE49-F238E27FC236}">
+                <a16:creationId xmlns:a16="http://schemas.microsoft.com/office/drawing/2014/main" id="{9AF7C446-EB08-3346-B4BC-691B9C700CF9}"/>
+              </a:ext>
+            </a:extLst>
+          </p:cNvPr>
+          <p:cNvSpPr>
+            <a:spLocks noGrp="1"/>
+          </p:cNvSpPr>
+          <p:nvPr>
+            <p:ph type="title"/>
+          </p:nvPr>
+        </p:nvSpPr>
+        <p:spPr/>
+        <p:txBody>
+          <a:bodyPr/>
+          <a:lstStyle/>
+          <a:p>
+            <a:r>
+              <a:rPr lang="en-CH" dirty="0"/>
+              <a:t>THE Floor is Java: DEMO</a:t>
+            </a:r>
+          </a:p>
+        </p:txBody>
+      </p:sp>
+    </p:spTree>
+    <p:extLst>
+      <p:ext uri="{BB962C8B-B14F-4D97-AF65-F5344CB8AC3E}">
+        <p14:creationId xmlns:p14="http://schemas.microsoft.com/office/powerpoint/2010/main" val="5628662"/>
+      </p:ext>
+    </p:extLst>
+  </p:cSld>
+  <p:clrMapOvr>
+    <a:masterClrMapping/>
+  </p:clrMapOvr>
+</p:sld>
+</file>
+
+<file path=ppt/slides/slide4.xml><?xml version="1.0" encoding="utf-8"?>
+<p:sld xmlns:a="http://schemas.openxmlformats.org/drawingml/2006/main" xmlns:r="http://schemas.openxmlformats.org/officeDocument/2006/relationships" xmlns:p="http://schemas.openxmlformats.org/presentationml/2006/main">
+  <p:cSld>
+    <p:spTree>
+      <p:nvGrpSpPr>
+        <p:cNvPr id="1" name=""/>
+        <p:cNvGrpSpPr/>
+        <p:nvPr/>
+      </p:nvGrpSpPr>
+      <p:grpSpPr>
+        <a:xfrm>
+          <a:off x="0" y="0"/>
+          <a:ext cx="0" cy="0"/>
+          <a:chOff x="0" y="0"/>
+          <a:chExt cx="0" cy="0"/>
+        </a:xfrm>
+      </p:grpSpPr>
+      <p:sp>
+        <p:nvSpPr>
+          <p:cNvPr id="2" name="Title 1">
+            <a:extLst>
+              <a:ext uri="{FF2B5EF4-FFF2-40B4-BE49-F238E27FC236}">
                 <a16:creationId xmlns:a16="http://schemas.microsoft.com/office/drawing/2014/main" id="{7CCF9DE8-8AA3-6B4D-AF8A-5F04A67E6985}"/>
               </a:ext>
             </a:extLst>
@@ -3442,12 +3599,6 @@
         <p:txBody>
           <a:bodyPr/>
           <a:lstStyle/>
-          <a:p>
-            <a:pPr marL="0" indent="0">
-              <a:buNone/>
-            </a:pPr>
-            <a:endParaRPr lang="en-CH" dirty="0"/>
-          </a:p>
           <a:p>
             <a:r>
               <a:rPr lang="en-CH" dirty="0"/>
@@ -3487,7 +3638,7 @@
 </p:sld>
 </file>
 
-<file path=ppt/slides/slide4.xml><?xml version="1.0" encoding="utf-8"?>
+<file path=ppt/slides/slide5.xml><?xml version="1.0" encoding="utf-8"?>
 <p:sld xmlns:a="http://schemas.openxmlformats.org/drawingml/2006/main" xmlns:r="http://schemas.openxmlformats.org/officeDocument/2006/relationships" xmlns:p="http://schemas.openxmlformats.org/presentationml/2006/main">
   <p:cSld>
     <p:spTree>

</xml_diff>

<commit_message>
shortened the slides of the Game Rules
</commit_message>
<xml_diff>
--- a/Meilenstein5-presentation/Meilenstein5.pptx
+++ b/Meilenstein5-presentation/Meilenstein5.pptx
@@ -3428,7 +3428,7 @@
           <a:p>
             <a:r>
               <a:rPr lang="de-CH" dirty="0"/>
-              <a:t>Sieger ist Spieler mit meisten Punkten am Ende</a:t>
+              <a:t>Sieger ist Spieler mit den meisten Punkten am Ende</a:t>
             </a:r>
           </a:p>
           <a:p>
@@ -3440,19 +3440,7 @@
           <a:p>
             <a:r>
               <a:rPr lang="de-CH" dirty="0"/>
-              <a:t>Spiel besteht aus 10 Runden à 20 Sekunden</a:t>
-            </a:r>
-          </a:p>
-          <a:p>
-            <a:r>
-              <a:rPr lang="de-CH" dirty="0"/>
-              <a:t>Am Ende jeder Runde zufällig ein Event: Überflutung, Erdbeben oder spawnen von Äpfel</a:t>
-            </a:r>
-          </a:p>
-          <a:p>
-            <a:r>
-              <a:rPr lang="de-CH" dirty="0"/>
-              <a:t>Startpositionen nicht von Events betroffen</a:t>
+              <a:t>Spiel besteht aus 10 Runden à 20 Sekunden plus einem Event.</a:t>
             </a:r>
           </a:p>
           <a:p>

</xml_diff>